<commit_message>
small edits to ppt presentation
</commit_message>
<xml_diff>
--- a/presentation/Little Rascals PK Schools in NYC.pptx
+++ b/presentation/Little Rascals PK Schools in NYC.pptx
@@ -151,17 +151,25 @@
   <pc:docChgLst>
     <pc:chgData name="Jason Wattier" userId="de6cb9e11468ad32" providerId="LiveId" clId="{08B1F191-BDD3-4D15-9FF0-A4B208AB6D25}"/>
     <pc:docChg chg="undo custSel mod addSld delSld modSld sldOrd">
-      <pc:chgData name="Jason Wattier" userId="de6cb9e11468ad32" providerId="LiveId" clId="{08B1F191-BDD3-4D15-9FF0-A4B208AB6D25}" dt="2020-02-09T21:20:16.121" v="2013" actId="962"/>
+      <pc:chgData name="Jason Wattier" userId="de6cb9e11468ad32" providerId="LiveId" clId="{08B1F191-BDD3-4D15-9FF0-A4B208AB6D25}" dt="2020-02-09T21:23:53.281" v="2029" actId="478"/>
       <pc:docMkLst>
         <pc:docMk/>
       </pc:docMkLst>
       <pc:sldChg chg="modSp">
-        <pc:chgData name="Jason Wattier" userId="de6cb9e11468ad32" providerId="LiveId" clId="{08B1F191-BDD3-4D15-9FF0-A4B208AB6D25}" dt="2020-02-09T20:46:40.381" v="1070" actId="20577"/>
+        <pc:chgData name="Jason Wattier" userId="de6cb9e11468ad32" providerId="LiveId" clId="{08B1F191-BDD3-4D15-9FF0-A4B208AB6D25}" dt="2020-02-09T21:22:47.895" v="2021" actId="113"/>
         <pc:sldMkLst>
           <pc:docMk/>
           <pc:sldMk cId="2177531203" sldId="257"/>
         </pc:sldMkLst>
         <pc:spChg chg="mod">
+          <ac:chgData name="Jason Wattier" userId="de6cb9e11468ad32" providerId="LiveId" clId="{08B1F191-BDD3-4D15-9FF0-A4B208AB6D25}" dt="2020-02-09T21:22:47.895" v="2021" actId="113"/>
+          <ac:spMkLst>
+            <pc:docMk/>
+            <pc:sldMk cId="2177531203" sldId="257"/>
+            <ac:spMk id="2" creationId="{0C08D63F-DF73-4B37-BE21-9F65E6DBC3F2}"/>
+          </ac:spMkLst>
+        </pc:spChg>
+        <pc:spChg chg="mod">
           <ac:chgData name="Jason Wattier" userId="de6cb9e11468ad32" providerId="LiveId" clId="{08B1F191-BDD3-4D15-9FF0-A4B208AB6D25}" dt="2020-02-09T20:46:40.381" v="1070" actId="20577"/>
           <ac:spMkLst>
             <pc:docMk/>
@@ -171,13 +179,13 @@
         </pc:spChg>
       </pc:sldChg>
       <pc:sldChg chg="addSp delSp modSp">
-        <pc:chgData name="Jason Wattier" userId="de6cb9e11468ad32" providerId="LiveId" clId="{08B1F191-BDD3-4D15-9FF0-A4B208AB6D25}" dt="2020-02-09T20:45:51.336" v="1020" actId="962"/>
+        <pc:chgData name="Jason Wattier" userId="de6cb9e11468ad32" providerId="LiveId" clId="{08B1F191-BDD3-4D15-9FF0-A4B208AB6D25}" dt="2020-02-09T21:22:20.367" v="2015" actId="113"/>
         <pc:sldMkLst>
           <pc:docMk/>
           <pc:sldMk cId="2541601075" sldId="259"/>
         </pc:sldMkLst>
         <pc:spChg chg="mod">
-          <ac:chgData name="Jason Wattier" userId="de6cb9e11468ad32" providerId="LiveId" clId="{08B1F191-BDD3-4D15-9FF0-A4B208AB6D25}" dt="2020-02-09T20:45:33.178" v="1017" actId="20577"/>
+          <ac:chgData name="Jason Wattier" userId="de6cb9e11468ad32" providerId="LiveId" clId="{08B1F191-BDD3-4D15-9FF0-A4B208AB6D25}" dt="2020-02-09T21:22:20.367" v="2015" actId="113"/>
           <ac:spMkLst>
             <pc:docMk/>
             <pc:sldMk cId="2541601075" sldId="259"/>
@@ -190,6 +198,14 @@
             <pc:docMk/>
             <pc:sldMk cId="2541601075" sldId="259"/>
             <ac:spMk id="3" creationId="{3B259F80-2AC5-44E7-AC1D-2F19ECEC8F9B}"/>
+          </ac:spMkLst>
+        </pc:spChg>
+        <pc:spChg chg="del">
+          <ac:chgData name="Jason Wattier" userId="de6cb9e11468ad32" providerId="LiveId" clId="{08B1F191-BDD3-4D15-9FF0-A4B208AB6D25}" dt="2020-02-09T21:22:16.593" v="2014" actId="478"/>
+          <ac:spMkLst>
+            <pc:docMk/>
+            <pc:sldMk cId="2541601075" sldId="259"/>
+            <ac:spMk id="4" creationId="{351676D4-3884-41F3-83F9-EBB484F1F7ED}"/>
           </ac:spMkLst>
         </pc:spChg>
         <pc:picChg chg="add mod">
@@ -217,13 +233,13 @@
         </pc:spChg>
       </pc:sldChg>
       <pc:sldChg chg="delSp modSp delDesignElem">
-        <pc:chgData name="Jason Wattier" userId="de6cb9e11468ad32" providerId="LiveId" clId="{08B1F191-BDD3-4D15-9FF0-A4B208AB6D25}" dt="2020-02-09T21:16:54.741" v="1991" actId="1076"/>
+        <pc:chgData name="Jason Wattier" userId="de6cb9e11468ad32" providerId="LiveId" clId="{08B1F191-BDD3-4D15-9FF0-A4B208AB6D25}" dt="2020-02-09T21:22:40.510" v="2020" actId="113"/>
         <pc:sldMkLst>
           <pc:docMk/>
           <pc:sldMk cId="1750528912" sldId="261"/>
         </pc:sldMkLst>
         <pc:spChg chg="mod">
-          <ac:chgData name="Jason Wattier" userId="de6cb9e11468ad32" providerId="LiveId" clId="{08B1F191-BDD3-4D15-9FF0-A4B208AB6D25}" dt="2020-02-09T21:16:33.935" v="1988" actId="3064"/>
+          <ac:chgData name="Jason Wattier" userId="de6cb9e11468ad32" providerId="LiveId" clId="{08B1F191-BDD3-4D15-9FF0-A4B208AB6D25}" dt="2020-02-09T21:22:40.510" v="2020" actId="113"/>
           <ac:spMkLst>
             <pc:docMk/>
             <pc:sldMk cId="1750528912" sldId="261"/>
@@ -296,11 +312,19 @@
         </pc:spChg>
       </pc:sldChg>
       <pc:sldChg chg="addSp delSp modSp addCm delCm">
-        <pc:chgData name="Jason Wattier" userId="de6cb9e11468ad32" providerId="LiveId" clId="{08B1F191-BDD3-4D15-9FF0-A4B208AB6D25}" dt="2020-02-09T21:14:52.243" v="1981" actId="1592"/>
+        <pc:chgData name="Jason Wattier" userId="de6cb9e11468ad32" providerId="LiveId" clId="{08B1F191-BDD3-4D15-9FF0-A4B208AB6D25}" dt="2020-02-09T21:22:34.831" v="2019" actId="115"/>
         <pc:sldMkLst>
           <pc:docMk/>
           <pc:sldMk cId="221482479" sldId="262"/>
         </pc:sldMkLst>
+        <pc:spChg chg="mod">
+          <ac:chgData name="Jason Wattier" userId="de6cb9e11468ad32" providerId="LiveId" clId="{08B1F191-BDD3-4D15-9FF0-A4B208AB6D25}" dt="2020-02-09T21:22:34.831" v="2019" actId="115"/>
+          <ac:spMkLst>
+            <pc:docMk/>
+            <pc:sldMk cId="221482479" sldId="262"/>
+            <ac:spMk id="2" creationId="{CF917D1E-0597-4A11-B2ED-CF456294B986}"/>
+          </ac:spMkLst>
+        </pc:spChg>
         <pc:spChg chg="mod">
           <ac:chgData name="Jason Wattier" userId="de6cb9e11468ad32" providerId="LiveId" clId="{08B1F191-BDD3-4D15-9FF0-A4B208AB6D25}" dt="2020-02-09T21:09:37.613" v="1978" actId="20577"/>
           <ac:spMkLst>
@@ -350,13 +374,13 @@
         </pc:spChg>
       </pc:sldChg>
       <pc:sldChg chg="addSp delSp modSp add">
-        <pc:chgData name="Jason Wattier" userId="de6cb9e11468ad32" providerId="LiveId" clId="{08B1F191-BDD3-4D15-9FF0-A4B208AB6D25}" dt="2020-02-09T21:20:16.121" v="2013" actId="962"/>
+        <pc:chgData name="Jason Wattier" userId="de6cb9e11468ad32" providerId="LiveId" clId="{08B1F191-BDD3-4D15-9FF0-A4B208AB6D25}" dt="2020-02-09T21:23:00.772" v="2022" actId="113"/>
         <pc:sldMkLst>
           <pc:docMk/>
           <pc:sldMk cId="1259333275" sldId="264"/>
         </pc:sldMkLst>
         <pc:spChg chg="mod">
-          <ac:chgData name="Jason Wattier" userId="de6cb9e11468ad32" providerId="LiveId" clId="{08B1F191-BDD3-4D15-9FF0-A4B208AB6D25}" dt="2020-02-09T19:17:07.218" v="24" actId="20577"/>
+          <ac:chgData name="Jason Wattier" userId="de6cb9e11468ad32" providerId="LiveId" clId="{08B1F191-BDD3-4D15-9FF0-A4B208AB6D25}" dt="2020-02-09T21:23:00.772" v="2022" actId="113"/>
           <ac:spMkLst>
             <pc:docMk/>
             <pc:sldMk cId="1259333275" sldId="264"/>
@@ -727,13 +751,13 @@
         </pc:picChg>
       </pc:sldChg>
       <pc:sldChg chg="addSp delSp modSp add">
-        <pc:chgData name="Jason Wattier" userId="de6cb9e11468ad32" providerId="LiveId" clId="{08B1F191-BDD3-4D15-9FF0-A4B208AB6D25}" dt="2020-02-09T20:52:44.220" v="1947" actId="113"/>
+        <pc:chgData name="Jason Wattier" userId="de6cb9e11468ad32" providerId="LiveId" clId="{08B1F191-BDD3-4D15-9FF0-A4B208AB6D25}" dt="2020-02-09T21:23:41.353" v="2026" actId="478"/>
         <pc:sldMkLst>
           <pc:docMk/>
           <pc:sldMk cId="237735258" sldId="271"/>
         </pc:sldMkLst>
         <pc:spChg chg="mod">
-          <ac:chgData name="Jason Wattier" userId="de6cb9e11468ad32" providerId="LiveId" clId="{08B1F191-BDD3-4D15-9FF0-A4B208AB6D25}" dt="2020-02-09T20:52:44.220" v="1947" actId="113"/>
+          <ac:chgData name="Jason Wattier" userId="de6cb9e11468ad32" providerId="LiveId" clId="{08B1F191-BDD3-4D15-9FF0-A4B208AB6D25}" dt="2020-02-09T21:23:25.117" v="2024" actId="255"/>
           <ac:spMkLst>
             <pc:docMk/>
             <pc:sldMk cId="237735258" sldId="271"/>
@@ -748,12 +772,20 @@
             <ac:spMk id="3" creationId="{A019412D-8AE3-4447-9E02-A118649D3162}"/>
           </ac:spMkLst>
         </pc:spChg>
-        <pc:spChg chg="mod">
-          <ac:chgData name="Jason Wattier" userId="de6cb9e11468ad32" providerId="LiveId" clId="{08B1F191-BDD3-4D15-9FF0-A4B208AB6D25}" dt="2020-02-09T20:37:19.430" v="998" actId="20577"/>
+        <pc:spChg chg="del mod">
+          <ac:chgData name="Jason Wattier" userId="de6cb9e11468ad32" providerId="LiveId" clId="{08B1F191-BDD3-4D15-9FF0-A4B208AB6D25}" dt="2020-02-09T21:23:35.709" v="2025" actId="478"/>
           <ac:spMkLst>
             <pc:docMk/>
             <pc:sldMk cId="237735258" sldId="271"/>
             <ac:spMk id="4" creationId="{75CA6C31-50DE-4281-A071-9CBCB6DD786C}"/>
+          </ac:spMkLst>
+        </pc:spChg>
+        <pc:spChg chg="add del mod">
+          <ac:chgData name="Jason Wattier" userId="de6cb9e11468ad32" providerId="LiveId" clId="{08B1F191-BDD3-4D15-9FF0-A4B208AB6D25}" dt="2020-02-09T21:23:41.353" v="2026" actId="478"/>
+          <ac:spMkLst>
+            <pc:docMk/>
+            <pc:sldMk cId="237735258" sldId="271"/>
+            <ac:spMk id="5" creationId="{1260D742-0E47-48D1-B8F1-E5DDDDE4E902}"/>
           </ac:spMkLst>
         </pc:spChg>
         <pc:picChg chg="add mod">
@@ -766,17 +798,25 @@
         </pc:picChg>
       </pc:sldChg>
       <pc:sldChg chg="addSp delSp modSp add">
-        <pc:chgData name="Jason Wattier" userId="de6cb9e11468ad32" providerId="LiveId" clId="{08B1F191-BDD3-4D15-9FF0-A4B208AB6D25}" dt="2020-02-09T20:52:40.672" v="1946" actId="113"/>
+        <pc:chgData name="Jason Wattier" userId="de6cb9e11468ad32" providerId="LiveId" clId="{08B1F191-BDD3-4D15-9FF0-A4B208AB6D25}" dt="2020-02-09T21:23:53.281" v="2029" actId="478"/>
         <pc:sldMkLst>
           <pc:docMk/>
           <pc:sldMk cId="3841581808" sldId="272"/>
         </pc:sldMkLst>
         <pc:spChg chg="mod">
-          <ac:chgData name="Jason Wattier" userId="de6cb9e11468ad32" providerId="LiveId" clId="{08B1F191-BDD3-4D15-9FF0-A4B208AB6D25}" dt="2020-02-09T20:52:40.672" v="1946" actId="113"/>
+          <ac:chgData name="Jason Wattier" userId="de6cb9e11468ad32" providerId="LiveId" clId="{08B1F191-BDD3-4D15-9FF0-A4B208AB6D25}" dt="2020-02-09T21:23:19.017" v="2023" actId="255"/>
           <ac:spMkLst>
             <pc:docMk/>
             <pc:sldMk cId="3841581808" sldId="272"/>
             <ac:spMk id="2" creationId="{CB7B1ED4-557B-476C-83D5-530286F6021F}"/>
+          </ac:spMkLst>
+        </pc:spChg>
+        <pc:spChg chg="del mod">
+          <ac:chgData name="Jason Wattier" userId="de6cb9e11468ad32" providerId="LiveId" clId="{08B1F191-BDD3-4D15-9FF0-A4B208AB6D25}" dt="2020-02-09T21:23:53.281" v="2029" actId="478"/>
+          <ac:spMkLst>
+            <pc:docMk/>
+            <pc:sldMk cId="3841581808" sldId="272"/>
+            <ac:spMk id="4" creationId="{75CA6C31-50DE-4281-A071-9CBCB6DD786C}"/>
           </ac:spMkLst>
         </pc:spChg>
         <pc:spChg chg="add del mod">
@@ -4311,11 +4351,13 @@
         </p:nvSpPr>
         <p:spPr/>
         <p:txBody>
-          <a:bodyPr/>
-          <a:lstStyle/>
-          <a:p>
-            <a:r>
-              <a:rPr lang="en-US" b="1" dirty="0"/>
+          <a:bodyPr>
+            <a:normAutofit/>
+          </a:bodyPr>
+          <a:lstStyle/>
+          <a:p>
+            <a:r>
+              <a:rPr lang="en-US" sz="3600" b="1" dirty="0"/>
               <a:t>Numerical Analysis</a:t>
             </a:r>
           </a:p>
@@ -4355,34 +4397,6 @@
           </a:ln>
         </p:spPr>
       </p:pic>
-      <p:sp>
-        <p:nvSpPr>
-          <p:cNvPr id="4" name="Text Placeholder 3">
-            <a:extLst>
-              <a:ext uri="{FF2B5EF4-FFF2-40B4-BE49-F238E27FC236}">
-                <a16:creationId xmlns:a16="http://schemas.microsoft.com/office/drawing/2014/main" id="{75CA6C31-50DE-4281-A071-9CBCB6DD786C}"/>
-              </a:ext>
-            </a:extLst>
-          </p:cNvPr>
-          <p:cNvSpPr>
-            <a:spLocks noGrp="1"/>
-          </p:cNvSpPr>
-          <p:nvPr>
-            <p:ph type="body" sz="half" idx="2"/>
-          </p:nvPr>
-        </p:nvSpPr>
-        <p:spPr/>
-        <p:txBody>
-          <a:bodyPr/>
-          <a:lstStyle/>
-          <a:p>
-            <a:r>
-              <a:rPr lang="en-US" dirty="0"/>
-              <a:t>Distribution of seat ratio for all of NYC</a:t>
-            </a:r>
-          </a:p>
-        </p:txBody>
-      </p:sp>
     </p:spTree>
     <p:extLst>
       <p:ext uri="{BB962C8B-B14F-4D97-AF65-F5344CB8AC3E}">
@@ -4431,40 +4445,14 @@
         </p:nvSpPr>
         <p:spPr/>
         <p:txBody>
-          <a:bodyPr/>
-          <a:lstStyle/>
-          <a:p>
-            <a:r>
-              <a:rPr lang="en-US" b="1" dirty="0"/>
+          <a:bodyPr>
+            <a:normAutofit/>
+          </a:bodyPr>
+          <a:lstStyle/>
+          <a:p>
+            <a:r>
+              <a:rPr lang="en-US" sz="3600" b="1" dirty="0"/>
               <a:t>Numerical Analysis</a:t>
-            </a:r>
-          </a:p>
-        </p:txBody>
-      </p:sp>
-      <p:sp>
-        <p:nvSpPr>
-          <p:cNvPr id="4" name="Text Placeholder 3">
-            <a:extLst>
-              <a:ext uri="{FF2B5EF4-FFF2-40B4-BE49-F238E27FC236}">
-                <a16:creationId xmlns:a16="http://schemas.microsoft.com/office/drawing/2014/main" id="{75CA6C31-50DE-4281-A071-9CBCB6DD786C}"/>
-              </a:ext>
-            </a:extLst>
-          </p:cNvPr>
-          <p:cNvSpPr>
-            <a:spLocks noGrp="1"/>
-          </p:cNvSpPr>
-          <p:nvPr>
-            <p:ph type="body" sz="half" idx="2"/>
-          </p:nvPr>
-        </p:nvSpPr>
-        <p:spPr/>
-        <p:txBody>
-          <a:bodyPr/>
-          <a:lstStyle/>
-          <a:p>
-            <a:r>
-              <a:rPr lang="en-US" dirty="0"/>
-              <a:t>Distribution of seat ratio for all of NYC</a:t>
             </a:r>
           </a:p>
         </p:txBody>
@@ -4728,7 +4716,7 @@
           <a:lstStyle/>
           <a:p>
             <a:r>
-              <a:rPr lang="en-US" dirty="0"/>
+              <a:rPr lang="en-US" b="1" dirty="0"/>
               <a:t>Questions</a:t>
             </a:r>
           </a:p>
@@ -4759,31 +4747,6 @@
         </p:blipFill>
         <p:spPr/>
       </p:pic>
-      <p:sp>
-        <p:nvSpPr>
-          <p:cNvPr id="4" name="Text Placeholder 3">
-            <a:extLst>
-              <a:ext uri="{FF2B5EF4-FFF2-40B4-BE49-F238E27FC236}">
-                <a16:creationId xmlns:a16="http://schemas.microsoft.com/office/drawing/2014/main" id="{351676D4-3884-41F3-83F9-EBB484F1F7ED}"/>
-              </a:ext>
-            </a:extLst>
-          </p:cNvPr>
-          <p:cNvSpPr>
-            <a:spLocks noGrp="1"/>
-          </p:cNvSpPr>
-          <p:nvPr>
-            <p:ph type="body" sz="half" idx="2"/>
-          </p:nvPr>
-        </p:nvSpPr>
-        <p:spPr/>
-        <p:txBody>
-          <a:bodyPr/>
-          <a:lstStyle/>
-          <a:p>
-            <a:endParaRPr lang="en-US" dirty="0"/>
-          </a:p>
-        </p:txBody>
-      </p:sp>
     </p:spTree>
     <p:extLst>
       <p:ext uri="{BB962C8B-B14F-4D97-AF65-F5344CB8AC3E}">
@@ -4836,7 +4799,7 @@
           <a:lstStyle/>
           <a:p>
             <a:r>
-              <a:rPr lang="en-US" dirty="0"/>
+              <a:rPr lang="en-US" b="1" dirty="0"/>
               <a:t>Agenda</a:t>
             </a:r>
           </a:p>
@@ -5034,7 +4997,7 @@
           <a:lstStyle/>
           <a:p>
             <a:r>
-              <a:rPr lang="en-US" spc="-100" dirty="0"/>
+              <a:rPr lang="en-US" b="1" spc="-100" dirty="0"/>
               <a:t>Background</a:t>
             </a:r>
           </a:p>
@@ -5241,8 +5204,12 @@
           <a:lstStyle/>
           <a:p>
             <a:r>
+              <a:rPr lang="en-US" b="1" u="sng" dirty="0"/>
+              <a:t>Background</a:t>
+            </a:r>
+            <a:r>
               <a:rPr lang="en-US" dirty="0"/>
-              <a:t>Background – Neighborhood Transit Areas (NTAs)</a:t>
+              <a:t> Neighborhood Transit Areas (NTAs)</a:t>
             </a:r>
           </a:p>
         </p:txBody>
@@ -5440,7 +5407,7 @@
           <a:lstStyle/>
           <a:p>
             <a:r>
-              <a:rPr lang="en-US" dirty="0"/>
+              <a:rPr lang="en-US" b="1" dirty="0"/>
               <a:t>Map Analysis</a:t>
             </a:r>
           </a:p>

</xml_diff>

<commit_message>
small update to UI and updated presentation
</commit_message>
<xml_diff>
--- a/presentation/Little Rascals PK Schools in NYC.pptx
+++ b/presentation/Little Rascals PK Schools in NYC.pptx
@@ -141,7 +141,7 @@
 <file path=ppt/revisionInfo.xml><?xml version="1.0" encoding="utf-8"?>
 <p1510:revInfo xmlns:a="http://schemas.openxmlformats.org/drawingml/2006/main" xmlns:r="http://schemas.openxmlformats.org/officeDocument/2006/relationships" xmlns:p1510="http://schemas.microsoft.com/office/powerpoint/2015/10/main">
   <p1510:revLst>
-    <p1510:client id="{08B1F191-BDD3-4D15-9FF0-A4B208AB6D25}" v="25" dt="2020-02-09T21:20:13.816"/>
+    <p1510:client id="{08B1F191-BDD3-4D15-9FF0-A4B208AB6D25}" v="29" dt="2020-02-10T04:13:44.755"/>
   </p1510:revLst>
 </p1510:revInfo>
 </file>
@@ -151,10 +151,25 @@
   <pc:docChgLst>
     <pc:chgData name="Jason Wattier" userId="de6cb9e11468ad32" providerId="LiveId" clId="{08B1F191-BDD3-4D15-9FF0-A4B208AB6D25}"/>
     <pc:docChg chg="undo custSel mod addSld delSld modSld sldOrd">
-      <pc:chgData name="Jason Wattier" userId="de6cb9e11468ad32" providerId="LiveId" clId="{08B1F191-BDD3-4D15-9FF0-A4B208AB6D25}" dt="2020-02-09T21:23:53.281" v="2029" actId="478"/>
+      <pc:chgData name="Jason Wattier" userId="de6cb9e11468ad32" providerId="LiveId" clId="{08B1F191-BDD3-4D15-9FF0-A4B208AB6D25}" dt="2020-02-10T04:14:32.220" v="2195" actId="1036"/>
       <pc:docMkLst>
         <pc:docMk/>
       </pc:docMkLst>
+      <pc:sldChg chg="modSp">
+        <pc:chgData name="Jason Wattier" userId="de6cb9e11468ad32" providerId="LiveId" clId="{08B1F191-BDD3-4D15-9FF0-A4B208AB6D25}" dt="2020-02-10T04:00:03.738" v="2037" actId="20577"/>
+        <pc:sldMkLst>
+          <pc:docMk/>
+          <pc:sldMk cId="212697383" sldId="256"/>
+        </pc:sldMkLst>
+        <pc:spChg chg="mod">
+          <ac:chgData name="Jason Wattier" userId="de6cb9e11468ad32" providerId="LiveId" clId="{08B1F191-BDD3-4D15-9FF0-A4B208AB6D25}" dt="2020-02-10T04:00:03.738" v="2037" actId="20577"/>
+          <ac:spMkLst>
+            <pc:docMk/>
+            <pc:sldMk cId="212697383" sldId="256"/>
+            <ac:spMk id="3" creationId="{7E152252-561A-4767-862C-7A2485BF4B77}"/>
+          </ac:spMkLst>
+        </pc:spChg>
+      </pc:sldChg>
       <pc:sldChg chg="modSp">
         <pc:chgData name="Jason Wattier" userId="de6cb9e11468ad32" providerId="LiveId" clId="{08B1F191-BDD3-4D15-9FF0-A4B208AB6D25}" dt="2020-02-09T21:22:47.895" v="2021" actId="113"/>
         <pc:sldMkLst>
@@ -233,7 +248,7 @@
         </pc:spChg>
       </pc:sldChg>
       <pc:sldChg chg="delSp modSp delDesignElem">
-        <pc:chgData name="Jason Wattier" userId="de6cb9e11468ad32" providerId="LiveId" clId="{08B1F191-BDD3-4D15-9FF0-A4B208AB6D25}" dt="2020-02-09T21:22:40.510" v="2020" actId="113"/>
+        <pc:chgData name="Jason Wattier" userId="de6cb9e11468ad32" providerId="LiveId" clId="{08B1F191-BDD3-4D15-9FF0-A4B208AB6D25}" dt="2020-02-10T04:00:37.218" v="2049" actId="20577"/>
         <pc:sldMkLst>
           <pc:docMk/>
           <pc:sldMk cId="1750528912" sldId="261"/>
@@ -255,7 +270,7 @@
           </ac:spMkLst>
         </pc:spChg>
         <pc:spChg chg="mod">
-          <ac:chgData name="Jason Wattier" userId="de6cb9e11468ad32" providerId="LiveId" clId="{08B1F191-BDD3-4D15-9FF0-A4B208AB6D25}" dt="2020-02-09T21:16:44.689" v="1989" actId="14100"/>
+          <ac:chgData name="Jason Wattier" userId="de6cb9e11468ad32" providerId="LiveId" clId="{08B1F191-BDD3-4D15-9FF0-A4B208AB6D25}" dt="2020-02-10T04:00:37.218" v="2049" actId="20577"/>
           <ac:spMkLst>
             <pc:docMk/>
             <pc:sldMk cId="1750528912" sldId="261"/>
@@ -312,7 +327,7 @@
         </pc:spChg>
       </pc:sldChg>
       <pc:sldChg chg="addSp delSp modSp addCm delCm">
-        <pc:chgData name="Jason Wattier" userId="de6cb9e11468ad32" providerId="LiveId" clId="{08B1F191-BDD3-4D15-9FF0-A4B208AB6D25}" dt="2020-02-09T21:22:34.831" v="2019" actId="115"/>
+        <pc:chgData name="Jason Wattier" userId="de6cb9e11468ad32" providerId="LiveId" clId="{08B1F191-BDD3-4D15-9FF0-A4B208AB6D25}" dt="2020-02-10T04:01:46.915" v="2056" actId="20577"/>
         <pc:sldMkLst>
           <pc:docMk/>
           <pc:sldMk cId="221482479" sldId="262"/>
@@ -326,7 +341,7 @@
           </ac:spMkLst>
         </pc:spChg>
         <pc:spChg chg="mod">
-          <ac:chgData name="Jason Wattier" userId="de6cb9e11468ad32" providerId="LiveId" clId="{08B1F191-BDD3-4D15-9FF0-A4B208AB6D25}" dt="2020-02-09T21:09:37.613" v="1978" actId="20577"/>
+          <ac:chgData name="Jason Wattier" userId="de6cb9e11468ad32" providerId="LiveId" clId="{08B1F191-BDD3-4D15-9FF0-A4B208AB6D25}" dt="2020-02-10T04:01:46.915" v="2056" actId="20577"/>
           <ac:spMkLst>
             <pc:docMk/>
             <pc:sldMk cId="221482479" sldId="262"/>
@@ -374,7 +389,7 @@
         </pc:spChg>
       </pc:sldChg>
       <pc:sldChg chg="addSp delSp modSp add">
-        <pc:chgData name="Jason Wattier" userId="de6cb9e11468ad32" providerId="LiveId" clId="{08B1F191-BDD3-4D15-9FF0-A4B208AB6D25}" dt="2020-02-09T21:23:00.772" v="2022" actId="113"/>
+        <pc:chgData name="Jason Wattier" userId="de6cb9e11468ad32" providerId="LiveId" clId="{08B1F191-BDD3-4D15-9FF0-A4B208AB6D25}" dt="2020-02-10T04:03:41.127" v="2152" actId="20577"/>
         <pc:sldMkLst>
           <pc:docMk/>
           <pc:sldMk cId="1259333275" sldId="264"/>
@@ -388,7 +403,7 @@
           </ac:spMkLst>
         </pc:spChg>
         <pc:spChg chg="mod">
-          <ac:chgData name="Jason Wattier" userId="de6cb9e11468ad32" providerId="LiveId" clId="{08B1F191-BDD3-4D15-9FF0-A4B208AB6D25}" dt="2020-02-09T21:05:01.937" v="1965" actId="13926"/>
+          <ac:chgData name="Jason Wattier" userId="de6cb9e11468ad32" providerId="LiveId" clId="{08B1F191-BDD3-4D15-9FF0-A4B208AB6D25}" dt="2020-02-10T04:03:41.127" v="2152" actId="20577"/>
           <ac:spMkLst>
             <pc:docMk/>
             <pc:sldMk cId="1259333275" sldId="264"/>
@@ -601,12 +616,20 @@
           </ac:spMkLst>
         </pc:spChg>
       </pc:sldChg>
-      <pc:sldChg chg="delSp modSp add ord setBg delDesignElem">
-        <pc:chgData name="Jason Wattier" userId="de6cb9e11468ad32" providerId="LiveId" clId="{08B1F191-BDD3-4D15-9FF0-A4B208AB6D25}" dt="2020-02-09T19:29:16.952" v="738" actId="115"/>
+      <pc:sldChg chg="addSp delSp modSp add del ord setBg delDesignElem">
+        <pc:chgData name="Jason Wattier" userId="de6cb9e11468ad32" providerId="LiveId" clId="{08B1F191-BDD3-4D15-9FF0-A4B208AB6D25}" dt="2020-02-10T04:12:23.773" v="2184" actId="692"/>
         <pc:sldMkLst>
           <pc:docMk/>
           <pc:sldMk cId="3478773319" sldId="268"/>
         </pc:sldMkLst>
+        <pc:spChg chg="add del mod">
+          <ac:chgData name="Jason Wattier" userId="de6cb9e11468ad32" providerId="LiveId" clId="{08B1F191-BDD3-4D15-9FF0-A4B208AB6D25}" dt="2020-02-10T04:10:51.241" v="2172" actId="931"/>
+          <ac:spMkLst>
+            <pc:docMk/>
+            <pc:sldMk cId="3478773319" sldId="268"/>
+            <ac:spMk id="3" creationId="{3226CC9C-7F3D-4E1D-9180-37092D5B5EC8}"/>
+          </ac:spMkLst>
+        </pc:spChg>
         <pc:spChg chg="mod">
           <ac:chgData name="Jason Wattier" userId="de6cb9e11468ad32" providerId="LiveId" clId="{08B1F191-BDD3-4D15-9FF0-A4B208AB6D25}" dt="2020-02-09T19:29:16.952" v="738" actId="115"/>
           <ac:spMkLst>
@@ -655,17 +678,25 @@
             <ac:spMk id="19" creationId="{027ADCA0-A066-4B16-8E1F-3C2483947B72}"/>
           </ac:spMkLst>
         </pc:spChg>
-        <pc:picChg chg="mod">
-          <ac:chgData name="Jason Wattier" userId="de6cb9e11468ad32" providerId="LiveId" clId="{08B1F191-BDD3-4D15-9FF0-A4B208AB6D25}" dt="2020-02-09T19:28:41.107" v="732" actId="1076"/>
+        <pc:picChg chg="del mod">
+          <ac:chgData name="Jason Wattier" userId="de6cb9e11468ad32" providerId="LiveId" clId="{08B1F191-BDD3-4D15-9FF0-A4B208AB6D25}" dt="2020-02-10T04:09:37.926" v="2171" actId="478"/>
           <ac:picMkLst>
             <pc:docMk/>
             <pc:sldMk cId="3478773319" sldId="268"/>
             <ac:picMk id="6" creationId="{621CD0B0-C92D-46CE-9961-5BAC1391558F}"/>
           </ac:picMkLst>
         </pc:picChg>
+        <pc:picChg chg="add mod">
+          <ac:chgData name="Jason Wattier" userId="de6cb9e11468ad32" providerId="LiveId" clId="{08B1F191-BDD3-4D15-9FF0-A4B208AB6D25}" dt="2020-02-10T04:12:23.773" v="2184" actId="692"/>
+          <ac:picMkLst>
+            <pc:docMk/>
+            <pc:sldMk cId="3478773319" sldId="268"/>
+            <ac:picMk id="7" creationId="{04F062DE-747D-4A8B-B8DF-38C85ABFB003}"/>
+          </ac:picMkLst>
+        </pc:picChg>
       </pc:sldChg>
       <pc:sldChg chg="addSp delSp modSp add">
-        <pc:chgData name="Jason Wattier" userId="de6cb9e11468ad32" providerId="LiveId" clId="{08B1F191-BDD3-4D15-9FF0-A4B208AB6D25}" dt="2020-02-09T21:18:50.383" v="2010" actId="692"/>
+        <pc:chgData name="Jason Wattier" userId="de6cb9e11468ad32" providerId="LiveId" clId="{08B1F191-BDD3-4D15-9FF0-A4B208AB6D25}" dt="2020-02-10T04:14:17.347" v="2193" actId="1076"/>
         <pc:sldMkLst>
           <pc:docMk/>
           <pc:sldMk cId="1897896653" sldId="269"/>
@@ -678,6 +709,14 @@
             <ac:spMk id="3" creationId="{C8BAD4E6-EAAC-463F-AAE5-A6E88219B5AF}"/>
           </ac:spMkLst>
         </pc:spChg>
+        <pc:spChg chg="add del mod">
+          <ac:chgData name="Jason Wattier" userId="de6cb9e11468ad32" providerId="LiveId" clId="{08B1F191-BDD3-4D15-9FF0-A4B208AB6D25}" dt="2020-02-10T04:13:44.754" v="2187" actId="931"/>
+          <ac:spMkLst>
+            <pc:docMk/>
+            <pc:sldMk cId="1897896653" sldId="269"/>
+            <ac:spMk id="3" creationId="{DEB63D2B-D87E-4F8B-9F1A-944BB07EDD04}"/>
+          </ac:spMkLst>
+        </pc:spChg>
         <pc:spChg chg="mod">
           <ac:chgData name="Jason Wattier" userId="de6cb9e11468ad32" providerId="LiveId" clId="{08B1F191-BDD3-4D15-9FF0-A4B208AB6D25}" dt="2020-02-09T19:35:46.943" v="858" actId="20577"/>
           <ac:spMkLst>
@@ -702,8 +741,16 @@
             <ac:picMk id="6" creationId="{621CD0B0-C92D-46CE-9961-5BAC1391558F}"/>
           </ac:picMkLst>
         </pc:picChg>
+        <pc:picChg chg="add mod">
+          <ac:chgData name="Jason Wattier" userId="de6cb9e11468ad32" providerId="LiveId" clId="{08B1F191-BDD3-4D15-9FF0-A4B208AB6D25}" dt="2020-02-10T04:14:17.347" v="2193" actId="1076"/>
+          <ac:picMkLst>
+            <pc:docMk/>
+            <pc:sldMk cId="1897896653" sldId="269"/>
+            <ac:picMk id="6" creationId="{7FC41C94-ABB3-41B3-BD03-762C15856B65}"/>
+          </ac:picMkLst>
+        </pc:picChg>
         <pc:picChg chg="add del mod">
-          <ac:chgData name="Jason Wattier" userId="de6cb9e11468ad32" providerId="LiveId" clId="{08B1F191-BDD3-4D15-9FF0-A4B208AB6D25}" dt="2020-02-09T21:18:50.383" v="2010" actId="692"/>
+          <ac:chgData name="Jason Wattier" userId="de6cb9e11468ad32" providerId="LiveId" clId="{08B1F191-BDD3-4D15-9FF0-A4B208AB6D25}" dt="2020-02-10T04:12:41.836" v="2186" actId="478"/>
           <ac:picMkLst>
             <pc:docMk/>
             <pc:sldMk cId="1897896653" sldId="269"/>
@@ -712,7 +759,7 @@
         </pc:picChg>
       </pc:sldChg>
       <pc:sldChg chg="addSp delSp modSp add">
-        <pc:chgData name="Jason Wattier" userId="de6cb9e11468ad32" providerId="LiveId" clId="{08B1F191-BDD3-4D15-9FF0-A4B208AB6D25}" dt="2020-02-09T20:48:33.830" v="1292" actId="478"/>
+        <pc:chgData name="Jason Wattier" userId="de6cb9e11468ad32" providerId="LiveId" clId="{08B1F191-BDD3-4D15-9FF0-A4B208AB6D25}" dt="2020-02-10T04:14:32.220" v="2195" actId="1036"/>
         <pc:sldMkLst>
           <pc:docMk/>
           <pc:sldMk cId="2636099555" sldId="270"/>
@@ -733,6 +780,22 @@
             <ac:spMk id="5" creationId="{FCECA7AE-B963-4512-A435-7076068F3241}"/>
           </ac:spMkLst>
         </pc:spChg>
+        <pc:picChg chg="add del">
+          <ac:chgData name="Jason Wattier" userId="de6cb9e11468ad32" providerId="LiveId" clId="{08B1F191-BDD3-4D15-9FF0-A4B208AB6D25}" dt="2020-02-10T04:08:34.665" v="2162" actId="478"/>
+          <ac:picMkLst>
+            <pc:docMk/>
+            <pc:sldMk cId="2636099555" sldId="270"/>
+            <ac:picMk id="2" creationId="{34E8E44E-9407-491A-A0F8-261D5D1C1B2D}"/>
+          </ac:picMkLst>
+        </pc:picChg>
+        <pc:picChg chg="add mod">
+          <ac:chgData name="Jason Wattier" userId="de6cb9e11468ad32" providerId="LiveId" clId="{08B1F191-BDD3-4D15-9FF0-A4B208AB6D25}" dt="2020-02-10T04:14:32.220" v="2195" actId="1036"/>
+          <ac:picMkLst>
+            <pc:docMk/>
+            <pc:sldMk cId="2636099555" sldId="270"/>
+            <ac:picMk id="3" creationId="{BB4AF7E7-377D-414B-976D-AA8C6C9D755F}"/>
+          </ac:picMkLst>
+        </pc:picChg>
         <pc:picChg chg="del">
           <ac:chgData name="Jason Wattier" userId="de6cb9e11468ad32" providerId="LiveId" clId="{08B1F191-BDD3-4D15-9FF0-A4B208AB6D25}" dt="2020-02-09T19:38:14.932" v="863" actId="478"/>
           <ac:picMkLst>
@@ -741,8 +804,8 @@
             <ac:picMk id="6" creationId="{621CD0B0-C92D-46CE-9961-5BAC1391558F}"/>
           </ac:picMkLst>
         </pc:picChg>
-        <pc:picChg chg="add mod">
-          <ac:chgData name="Jason Wattier" userId="de6cb9e11468ad32" providerId="LiveId" clId="{08B1F191-BDD3-4D15-9FF0-A4B208AB6D25}" dt="2020-02-09T19:38:20.784" v="865" actId="1076"/>
+        <pc:picChg chg="add del mod">
+          <ac:chgData name="Jason Wattier" userId="de6cb9e11468ad32" providerId="LiveId" clId="{08B1F191-BDD3-4D15-9FF0-A4B208AB6D25}" dt="2020-02-10T04:08:26.443" v="2160" actId="478"/>
           <ac:picMkLst>
             <pc:docMk/>
             <pc:sldMk cId="2636099555" sldId="270"/>
@@ -868,7 +931,7 @@
         </pc:spChg>
       </pc:sldChg>
       <pc:sldChg chg="modSp add">
-        <pc:chgData name="Jason Wattier" userId="de6cb9e11468ad32" providerId="LiveId" clId="{08B1F191-BDD3-4D15-9FF0-A4B208AB6D25}" dt="2020-02-09T21:18:25.429" v="2009" actId="20577"/>
+        <pc:chgData name="Jason Wattier" userId="de6cb9e11468ad32" providerId="LiveId" clId="{08B1F191-BDD3-4D15-9FF0-A4B208AB6D25}" dt="2020-02-10T04:04:51.693" v="2159" actId="20577"/>
         <pc:sldMkLst>
           <pc:docMk/>
           <pc:sldMk cId="632115751" sldId="274"/>
@@ -882,7 +945,7 @@
           </ac:spMkLst>
         </pc:spChg>
         <pc:spChg chg="mod">
-          <ac:chgData name="Jason Wattier" userId="de6cb9e11468ad32" providerId="LiveId" clId="{08B1F191-BDD3-4D15-9FF0-A4B208AB6D25}" dt="2020-02-09T21:18:25.429" v="2009" actId="20577"/>
+          <ac:chgData name="Jason Wattier" userId="de6cb9e11468ad32" providerId="LiveId" clId="{08B1F191-BDD3-4D15-9FF0-A4B208AB6D25}" dt="2020-02-10T04:04:51.693" v="2159" actId="20577"/>
           <ac:spMkLst>
             <pc:docMk/>
             <pc:sldMk cId="632115751" sldId="274"/>
@@ -4195,7 +4258,7 @@
           <a:p>
             <a:r>
               <a:rPr lang="en-US" dirty="0"/>
-              <a:t>A View of New York City’s Universal Pre-School</a:t>
+              <a:t>A View of New York City’s Universal Pre-School Program</a:t>
             </a:r>
           </a:p>
         </p:txBody>
@@ -4271,15 +4334,15 @@
       </p:sp>
       <p:pic>
         <p:nvPicPr>
-          <p:cNvPr id="7" name="Content Placeholder 6" descr="A map with text&#10;&#10;Description automatically generated">
+          <p:cNvPr id="6" name="Content Placeholder 5" descr="A close up of a map&#10;&#10;Description automatically generated">
             <a:extLst>
               <a:ext uri="{FF2B5EF4-FFF2-40B4-BE49-F238E27FC236}">
-                <a16:creationId xmlns:a16="http://schemas.microsoft.com/office/drawing/2014/main" id="{36033F98-17A9-4A04-B6D8-891C35749DD9}"/>
+                <a16:creationId xmlns:a16="http://schemas.microsoft.com/office/drawing/2014/main" id="{7FC41C94-ABB3-41B3-BD03-762C15856B65}"/>
               </a:ext>
             </a:extLst>
           </p:cNvPr>
           <p:cNvPicPr>
-            <a:picLocks noGrp="1"/>
+            <a:picLocks noGrp="1" noChangeAspect="1"/>
           </p:cNvPicPr>
           <p:nvPr>
             <p:ph idx="1"/>
@@ -4293,8 +4356,8 @@
         </p:blipFill>
         <p:spPr>
           <a:xfrm>
-            <a:off x="5144008" y="763524"/>
-            <a:ext cx="4618365" cy="5330952"/>
+            <a:off x="5233133" y="868362"/>
+            <a:ext cx="4409986" cy="5121275"/>
           </a:xfrm>
           <a:ln>
             <a:solidFill>
@@ -4645,7 +4708,7 @@
           <a:p>
             <a:r>
               <a:rPr lang="en-US" sz="2400" dirty="0"/>
-              <a:t>Future Ideas:</a:t>
+              <a:t>Future Idea(s):</a:t>
             </a:r>
           </a:p>
           <a:p>
@@ -4653,13 +4716,6 @@
             <a:r>
               <a:rPr lang="en-US" sz="2400" dirty="0"/>
               <a:t>Analyze seat concentration at the School District level (32 in total), which is more aggregate than an NTA and may be more appropriate for city government planners.</a:t>
-            </a:r>
-          </a:p>
-          <a:p>
-            <a:pPr lvl="1"/>
-            <a:r>
-              <a:rPr lang="en-US" sz="2400" dirty="0"/>
-              <a:t>Allow dashboard to filter out minimum population size dynamically (current set to 12,000 as a rough cutoff).</a:t>
             </a:r>
           </a:p>
         </p:txBody>
@@ -5112,7 +5168,7 @@
           <a:p>
             <a:r>
               <a:rPr lang="en-US" dirty="0"/>
-              <a:t>In September 2014, New York City (“NYC”) launched universal pre-school (“Pre-K”) for children of age four, one year after first term Mayor Bill de Blasio took office. </a:t>
+              <a:t>In September 2014, New York City (“NYC”) launched its universal pre-school (“Pre-K”) program for children of age four, one year after first term Mayor Bill de Blasio took office. </a:t>
             </a:r>
           </a:p>
         </p:txBody>
@@ -5263,7 +5319,7 @@
           <a:p>
             <a:r>
               <a:rPr lang="en-US" dirty="0"/>
-              <a:t>NTAs (195 in total) represent a balance between a high-level view of borough (5) or community districts (59) and a very detailed view of census tracts (2,168).</a:t>
+              <a:t>NTAs (195 in total) represent a balance between a high-level view of boroughs (5) or community districts (59) and a very detailed view of census tracts (2,168).</a:t>
             </a:r>
           </a:p>
         </p:txBody>
@@ -5438,7 +5494,7 @@
           <a:p>
             <a:r>
               <a:rPr lang="en-US" dirty="0"/>
-              <a:t>Combines NTA segmentation with 2010 census data and Pre-K school location September 2018.</a:t>
+              <a:t>Combines NTA segmentation with 2010 census data and Pre-K school location as of September 2018.</a:t>
             </a:r>
           </a:p>
           <a:p>
@@ -5450,7 +5506,7 @@
           <a:p>
             <a:r>
               <a:rPr lang="en-US" dirty="0"/>
-              <a:t>Two view – one that is based upon total number of seats in an NTA versus a ratio of capacity to population (“seats per 1,0000).</a:t>
+              <a:t>Two views – one based upon total number of seats in an NTA and a second using the ratio of seats to population within an NTA (“seats per 1000”).</a:t>
             </a:r>
           </a:p>
           <a:p>
@@ -5561,10 +5617,10 @@
       </p:sp>
       <p:pic>
         <p:nvPicPr>
-          <p:cNvPr id="7" name="Content Placeholder 7" descr="A close up of text on a white background&#10;&#10;Description automatically generated">
+          <p:cNvPr id="3" name="Picture 2">
             <a:extLst>
               <a:ext uri="{FF2B5EF4-FFF2-40B4-BE49-F238E27FC236}">
-                <a16:creationId xmlns:a16="http://schemas.microsoft.com/office/drawing/2014/main" id="{BA613605-4BB7-41DC-B674-60E869E0F717}"/>
+                <a16:creationId xmlns:a16="http://schemas.microsoft.com/office/drawing/2014/main" id="{BB4AF7E7-377D-414B-976D-AA8C6C9D755F}"/>
               </a:ext>
             </a:extLst>
           </p:cNvPr>
@@ -5581,12 +5637,17 @@
         </p:blipFill>
         <p:spPr>
           <a:xfrm>
-            <a:off x="4861543" y="759103"/>
-            <a:ext cx="5330650" cy="5330650"/>
+            <a:off x="5103627" y="722798"/>
+            <a:ext cx="4945657" cy="5454936"/>
           </a:xfrm>
           <a:prstGeom prst="rect">
             <a:avLst/>
           </a:prstGeom>
+          <a:ln>
+            <a:solidFill>
+              <a:schemeClr val="accent1"/>
+            </a:solidFill>
+          </a:ln>
         </p:spPr>
       </p:pic>
     </p:spTree>
@@ -5672,10 +5733,10 @@
       </p:sp>
       <p:pic>
         <p:nvPicPr>
-          <p:cNvPr id="6" name="Content Placeholder 5" descr="A screenshot of a map&#10;&#10;Description automatically generated">
+          <p:cNvPr id="7" name="Content Placeholder 6" descr="A close up of a map&#10;&#10;Description automatically generated">
             <a:extLst>
               <a:ext uri="{FF2B5EF4-FFF2-40B4-BE49-F238E27FC236}">
-                <a16:creationId xmlns:a16="http://schemas.microsoft.com/office/drawing/2014/main" id="{621CD0B0-C92D-46CE-9961-5BAC1391558F}"/>
+                <a16:creationId xmlns:a16="http://schemas.microsoft.com/office/drawing/2014/main" id="{04F062DE-747D-4A8B-B8DF-38C85ABFB003}"/>
               </a:ext>
             </a:extLst>
           </p:cNvPr>
@@ -5686,19 +5747,22 @@
             <p:ph idx="1"/>
           </p:nvPr>
         </p:nvPicPr>
-        <p:blipFill rotWithShape="1">
+        <p:blipFill>
           <a:blip r:embed="rId2"/>
-          <a:srcRect r="-3" b="16906"/>
-          <a:stretch/>
+          <a:stretch>
+            <a:fillRect/>
+          </a:stretch>
         </p:blipFill>
         <p:spPr>
           <a:xfrm>
-            <a:off x="4453890" y="763675"/>
-            <a:ext cx="6367271" cy="5330650"/>
+            <a:off x="5137439" y="787437"/>
+            <a:ext cx="4786798" cy="5283126"/>
           </a:xfrm>
-          <a:prstGeom prst="rect">
-            <a:avLst/>
-          </a:prstGeom>
+          <a:ln>
+            <a:solidFill>
+              <a:schemeClr val="accent1"/>
+            </a:solidFill>
+          </a:ln>
         </p:spPr>
       </p:pic>
     </p:spTree>

</xml_diff>

<commit_message>
corrected csv for NTA name diffs and updated ppt with new pics
</commit_message>
<xml_diff>
--- a/presentation/Little Rascals PK Schools in NYC.pptx
+++ b/presentation/Little Rascals PK Schools in NYC.pptx
@@ -141,7 +141,7 @@
 <file path=ppt/revisionInfo.xml><?xml version="1.0" encoding="utf-8"?>
 <p1510:revInfo xmlns:a="http://schemas.openxmlformats.org/drawingml/2006/main" xmlns:r="http://schemas.openxmlformats.org/officeDocument/2006/relationships" xmlns:p1510="http://schemas.microsoft.com/office/powerpoint/2015/10/main">
   <p1510:revLst>
-    <p1510:client id="{08B1F191-BDD3-4D15-9FF0-A4B208AB6D25}" v="29" dt="2020-02-10T04:13:44.755"/>
+    <p1510:client id="{08B1F191-BDD3-4D15-9FF0-A4B208AB6D25}" v="33" dt="2020-02-10T04:40:02.549"/>
   </p1510:revLst>
 </p1510:revInfo>
 </file>
@@ -151,7 +151,7 @@
   <pc:docChgLst>
     <pc:chgData name="Jason Wattier" userId="de6cb9e11468ad32" providerId="LiveId" clId="{08B1F191-BDD3-4D15-9FF0-A4B208AB6D25}"/>
     <pc:docChg chg="undo custSel mod addSld delSld modSld sldOrd">
-      <pc:chgData name="Jason Wattier" userId="de6cb9e11468ad32" providerId="LiveId" clId="{08B1F191-BDD3-4D15-9FF0-A4B208AB6D25}" dt="2020-02-10T04:14:32.220" v="2195" actId="1036"/>
+      <pc:chgData name="Jason Wattier" userId="de6cb9e11468ad32" providerId="LiveId" clId="{08B1F191-BDD3-4D15-9FF0-A4B208AB6D25}" dt="2020-02-10T04:40:03.228" v="2214" actId="962"/>
       <pc:docMkLst>
         <pc:docMk/>
       </pc:docMkLst>
@@ -814,7 +814,7 @@
         </pc:picChg>
       </pc:sldChg>
       <pc:sldChg chg="addSp delSp modSp add">
-        <pc:chgData name="Jason Wattier" userId="de6cb9e11468ad32" providerId="LiveId" clId="{08B1F191-BDD3-4D15-9FF0-A4B208AB6D25}" dt="2020-02-09T21:23:41.353" v="2026" actId="478"/>
+        <pc:chgData name="Jason Wattier" userId="de6cb9e11468ad32" providerId="LiveId" clId="{08B1F191-BDD3-4D15-9FF0-A4B208AB6D25}" dt="2020-02-10T04:37:27.775" v="2199" actId="962"/>
         <pc:sldMkLst>
           <pc:docMk/>
           <pc:sldMk cId="237735258" sldId="271"/>
@@ -835,6 +835,14 @@
             <ac:spMk id="3" creationId="{A019412D-8AE3-4447-9E02-A118649D3162}"/>
           </ac:spMkLst>
         </pc:spChg>
+        <pc:spChg chg="add del mod">
+          <ac:chgData name="Jason Wattier" userId="de6cb9e11468ad32" providerId="LiveId" clId="{08B1F191-BDD3-4D15-9FF0-A4B208AB6D25}" dt="2020-02-10T04:37:26.773" v="2197" actId="931"/>
+          <ac:spMkLst>
+            <pc:docMk/>
+            <pc:sldMk cId="237735258" sldId="271"/>
+            <ac:spMk id="4" creationId="{1E48BF6E-AAEB-4B74-ACE1-F909AD7C3B82}"/>
+          </ac:spMkLst>
+        </pc:spChg>
         <pc:spChg chg="del mod">
           <ac:chgData name="Jason Wattier" userId="de6cb9e11468ad32" providerId="LiveId" clId="{08B1F191-BDD3-4D15-9FF0-A4B208AB6D25}" dt="2020-02-09T21:23:35.709" v="2025" actId="478"/>
           <ac:spMkLst>
@@ -851,17 +859,25 @@
             <ac:spMk id="5" creationId="{1260D742-0E47-48D1-B8F1-E5DDDDE4E902}"/>
           </ac:spMkLst>
         </pc:spChg>
-        <pc:picChg chg="add mod">
-          <ac:chgData name="Jason Wattier" userId="de6cb9e11468ad32" providerId="LiveId" clId="{08B1F191-BDD3-4D15-9FF0-A4B208AB6D25}" dt="2020-02-09T20:37:51.001" v="1001" actId="692"/>
+        <pc:picChg chg="add del mod">
+          <ac:chgData name="Jason Wattier" userId="de6cb9e11468ad32" providerId="LiveId" clId="{08B1F191-BDD3-4D15-9FF0-A4B208AB6D25}" dt="2020-02-10T04:37:07.822" v="2196" actId="478"/>
           <ac:picMkLst>
             <pc:docMk/>
             <pc:sldMk cId="237735258" sldId="271"/>
             <ac:picMk id="6" creationId="{38AFC082-3CFC-4F13-A3C7-16F21D035296}"/>
           </ac:picMkLst>
         </pc:picChg>
+        <pc:picChg chg="add mod">
+          <ac:chgData name="Jason Wattier" userId="de6cb9e11468ad32" providerId="LiveId" clId="{08B1F191-BDD3-4D15-9FF0-A4B208AB6D25}" dt="2020-02-10T04:37:27.775" v="2199" actId="962"/>
+          <ac:picMkLst>
+            <pc:docMk/>
+            <pc:sldMk cId="237735258" sldId="271"/>
+            <ac:picMk id="7" creationId="{D703C0ED-84D6-4CFE-89F7-155E6371C738}"/>
+          </ac:picMkLst>
+        </pc:picChg>
       </pc:sldChg>
-      <pc:sldChg chg="addSp delSp modSp add">
-        <pc:chgData name="Jason Wattier" userId="de6cb9e11468ad32" providerId="LiveId" clId="{08B1F191-BDD3-4D15-9FF0-A4B208AB6D25}" dt="2020-02-09T21:23:53.281" v="2029" actId="478"/>
+      <pc:sldChg chg="addSp delSp modSp add del">
+        <pc:chgData name="Jason Wattier" userId="de6cb9e11468ad32" providerId="LiveId" clId="{08B1F191-BDD3-4D15-9FF0-A4B208AB6D25}" dt="2020-02-10T04:40:03.228" v="2214" actId="962"/>
         <pc:sldMkLst>
           <pc:docMk/>
           <pc:sldMk cId="3841581808" sldId="272"/>
@@ -874,6 +890,14 @@
             <ac:spMk id="2" creationId="{CB7B1ED4-557B-476C-83D5-530286F6021F}"/>
           </ac:spMkLst>
         </pc:spChg>
+        <pc:spChg chg="add del mod">
+          <ac:chgData name="Jason Wattier" userId="de6cb9e11468ad32" providerId="LiveId" clId="{08B1F191-BDD3-4D15-9FF0-A4B208AB6D25}" dt="2020-02-10T04:40:02.549" v="2212" actId="931"/>
+          <ac:spMkLst>
+            <pc:docMk/>
+            <pc:sldMk cId="3841581808" sldId="272"/>
+            <ac:spMk id="4" creationId="{3E586E16-6C5C-4B9F-8B00-5B67B584EFCB}"/>
+          </ac:spMkLst>
+        </pc:spChg>
         <pc:spChg chg="del mod">
           <ac:chgData name="Jason Wattier" userId="de6cb9e11468ad32" providerId="LiveId" clId="{08B1F191-BDD3-4D15-9FF0-A4B208AB6D25}" dt="2020-02-09T21:23:53.281" v="2029" actId="478"/>
           <ac:spMkLst>
@@ -890,6 +914,14 @@
             <ac:spMk id="5" creationId="{A629FC92-8DF0-45D5-A65B-91239AB25198}"/>
           </ac:spMkLst>
         </pc:spChg>
+        <pc:picChg chg="add mod">
+          <ac:chgData name="Jason Wattier" userId="de6cb9e11468ad32" providerId="LiveId" clId="{08B1F191-BDD3-4D15-9FF0-A4B208AB6D25}" dt="2020-02-10T04:40:03.228" v="2214" actId="962"/>
+          <ac:picMkLst>
+            <pc:docMk/>
+            <pc:sldMk cId="3841581808" sldId="272"/>
+            <ac:picMk id="6" creationId="{1FCF6DE6-7A3A-4D56-84DE-0146A6F02D9D}"/>
+          </ac:picMkLst>
+        </pc:picChg>
         <pc:picChg chg="del">
           <ac:chgData name="Jason Wattier" userId="de6cb9e11468ad32" providerId="LiveId" clId="{08B1F191-BDD3-4D15-9FF0-A4B208AB6D25}" dt="2020-02-09T20:43:32.875" v="1003" actId="478"/>
           <ac:picMkLst>
@@ -898,8 +930,8 @@
             <ac:picMk id="6" creationId="{38AFC082-3CFC-4F13-A3C7-16F21D035296}"/>
           </ac:picMkLst>
         </pc:picChg>
-        <pc:picChg chg="add mod">
-          <ac:chgData name="Jason Wattier" userId="de6cb9e11468ad32" providerId="LiveId" clId="{08B1F191-BDD3-4D15-9FF0-A4B208AB6D25}" dt="2020-02-09T20:43:48.390" v="1007" actId="692"/>
+        <pc:picChg chg="add del mod">
+          <ac:chgData name="Jason Wattier" userId="de6cb9e11468ad32" providerId="LiveId" clId="{08B1F191-BDD3-4D15-9FF0-A4B208AB6D25}" dt="2020-02-10T04:39:57.821" v="2211" actId="478"/>
           <ac:picMkLst>
             <pc:docMk/>
             <pc:sldMk cId="3841581808" sldId="272"/>
@@ -907,8 +939,8 @@
           </ac:picMkLst>
         </pc:picChg>
       </pc:sldChg>
-      <pc:sldChg chg="delSp modSp add">
-        <pc:chgData name="Jason Wattier" userId="de6cb9e11468ad32" providerId="LiveId" clId="{08B1F191-BDD3-4D15-9FF0-A4B208AB6D25}" dt="2020-02-09T20:46:49.091" v="1071" actId="478"/>
+      <pc:sldChg chg="addSp delSp modSp add">
+        <pc:chgData name="Jason Wattier" userId="de6cb9e11468ad32" providerId="LiveId" clId="{08B1F191-BDD3-4D15-9FF0-A4B208AB6D25}" dt="2020-02-10T04:39:55.268" v="2209" actId="931"/>
         <pc:sldMkLst>
           <pc:docMk/>
           <pc:sldMk cId="3250347881" sldId="273"/>
@@ -929,6 +961,14 @@
             <ac:spMk id="3" creationId="{9FA0BA89-FB3B-4200-B20E-3F5E2C200EEC}"/>
           </ac:spMkLst>
         </pc:spChg>
+        <pc:picChg chg="add del mod">
+          <ac:chgData name="Jason Wattier" userId="de6cb9e11468ad32" providerId="LiveId" clId="{08B1F191-BDD3-4D15-9FF0-A4B208AB6D25}" dt="2020-02-10T04:39:55.268" v="2209" actId="931"/>
+          <ac:picMkLst>
+            <pc:docMk/>
+            <pc:sldMk cId="3250347881" sldId="273"/>
+            <ac:picMk id="4" creationId="{5DD8F4C8-6896-405A-BDEF-B130C5FF0E65}"/>
+          </ac:picMkLst>
+        </pc:picChg>
       </pc:sldChg>
       <pc:sldChg chg="modSp add">
         <pc:chgData name="Jason Wattier" userId="de6cb9e11468ad32" providerId="LiveId" clId="{08B1F191-BDD3-4D15-9FF0-A4B208AB6D25}" dt="2020-02-10T04:04:51.693" v="2159" actId="20577"/>
@@ -4428,10 +4468,10 @@
       </p:sp>
       <p:pic>
         <p:nvPicPr>
-          <p:cNvPr id="6" name="Content Placeholder 5" descr="A screenshot of a cell phone&#10;&#10;Description automatically generated">
+          <p:cNvPr id="7" name="Content Placeholder 6" descr="A screenshot of a cell phone&#10;&#10;Description automatically generated">
             <a:extLst>
               <a:ext uri="{FF2B5EF4-FFF2-40B4-BE49-F238E27FC236}">
-                <a16:creationId xmlns:a16="http://schemas.microsoft.com/office/drawing/2014/main" id="{38AFC082-3CFC-4F13-A3C7-16F21D035296}"/>
+                <a16:creationId xmlns:a16="http://schemas.microsoft.com/office/drawing/2014/main" id="{D703C0ED-84D6-4CFE-89F7-155E6371C738}"/>
               </a:ext>
             </a:extLst>
           </p:cNvPr>
@@ -4450,14 +4490,9 @@
         </p:blipFill>
         <p:spPr>
           <a:xfrm>
-            <a:off x="4458857" y="868363"/>
-            <a:ext cx="6131785" cy="5121275"/>
+            <a:off x="4476312" y="868363"/>
+            <a:ext cx="6096876" cy="5121275"/>
           </a:xfrm>
-          <a:ln>
-            <a:solidFill>
-              <a:schemeClr val="accent1"/>
-            </a:solidFill>
-          </a:ln>
         </p:spPr>
       </p:pic>
     </p:spTree>
@@ -4522,10 +4557,10 @@
       </p:sp>
       <p:pic>
         <p:nvPicPr>
-          <p:cNvPr id="8" name="Content Placeholder 7" descr="A screenshot of a cell phone&#10;&#10;Description automatically generated">
+          <p:cNvPr id="6" name="Content Placeholder 5" descr="A screenshot of a cell phone&#10;&#10;Description automatically generated">
             <a:extLst>
               <a:ext uri="{FF2B5EF4-FFF2-40B4-BE49-F238E27FC236}">
-                <a16:creationId xmlns:a16="http://schemas.microsoft.com/office/drawing/2014/main" id="{DD95CFDF-0955-4F01-A09D-33C38FCD33BA}"/>
+                <a16:creationId xmlns:a16="http://schemas.microsoft.com/office/drawing/2014/main" id="{1FCF6DE6-7A3A-4D56-84DE-0146A6F02D9D}"/>
               </a:ext>
             </a:extLst>
           </p:cNvPr>
@@ -4544,14 +4579,9 @@
         </p:blipFill>
         <p:spPr>
           <a:xfrm>
-            <a:off x="4458857" y="868363"/>
-            <a:ext cx="6131785" cy="5121275"/>
+            <a:off x="4476312" y="868363"/>
+            <a:ext cx="6096876" cy="5121275"/>
           </a:xfrm>
-          <a:ln>
-            <a:solidFill>
-              <a:schemeClr val="accent1"/>
-            </a:solidFill>
-          </a:ln>
         </p:spPr>
       </p:pic>
     </p:spTree>

</xml_diff>

<commit_message>
minor UI update to change input title for min # to highlighted bc table is showing all
</commit_message>
<xml_diff>
--- a/presentation/Little Rascals PK Schools in NYC.pptx
+++ b/presentation/Little Rascals PK Schools in NYC.pptx
@@ -151,7 +151,7 @@
   <pc:docChgLst>
     <pc:chgData name="Jason Wattier" userId="de6cb9e11468ad32" providerId="LiveId" clId="{08B1F191-BDD3-4D15-9FF0-A4B208AB6D25}"/>
     <pc:docChg chg="undo custSel mod addSld delSld modSld sldOrd">
-      <pc:chgData name="Jason Wattier" userId="de6cb9e11468ad32" providerId="LiveId" clId="{08B1F191-BDD3-4D15-9FF0-A4B208AB6D25}" dt="2020-02-10T04:40:03.228" v="2214" actId="962"/>
+      <pc:chgData name="Jason Wattier" userId="de6cb9e11468ad32" providerId="LiveId" clId="{08B1F191-BDD3-4D15-9FF0-A4B208AB6D25}" dt="2020-02-10T04:45:28.876" v="2243" actId="1035"/>
       <pc:docMkLst>
         <pc:docMk/>
       </pc:docMkLst>
@@ -389,7 +389,7 @@
         </pc:spChg>
       </pc:sldChg>
       <pc:sldChg chg="addSp delSp modSp add">
-        <pc:chgData name="Jason Wattier" userId="de6cb9e11468ad32" providerId="LiveId" clId="{08B1F191-BDD3-4D15-9FF0-A4B208AB6D25}" dt="2020-02-10T04:03:41.127" v="2152" actId="20577"/>
+        <pc:chgData name="Jason Wattier" userId="de6cb9e11468ad32" providerId="LiveId" clId="{08B1F191-BDD3-4D15-9FF0-A4B208AB6D25}" dt="2020-02-10T04:44:57.241" v="2234" actId="20577"/>
         <pc:sldMkLst>
           <pc:docMk/>
           <pc:sldMk cId="1259333275" sldId="264"/>
@@ -403,7 +403,7 @@
           </ac:spMkLst>
         </pc:spChg>
         <pc:spChg chg="mod">
-          <ac:chgData name="Jason Wattier" userId="de6cb9e11468ad32" providerId="LiveId" clId="{08B1F191-BDD3-4D15-9FF0-A4B208AB6D25}" dt="2020-02-10T04:03:41.127" v="2152" actId="20577"/>
+          <ac:chgData name="Jason Wattier" userId="de6cb9e11468ad32" providerId="LiveId" clId="{08B1F191-BDD3-4D15-9FF0-A4B208AB6D25}" dt="2020-02-10T04:44:57.241" v="2234" actId="20577"/>
           <ac:spMkLst>
             <pc:docMk/>
             <pc:sldMk cId="1259333275" sldId="264"/>
@@ -696,7 +696,7 @@
         </pc:picChg>
       </pc:sldChg>
       <pc:sldChg chg="addSp delSp modSp add">
-        <pc:chgData name="Jason Wattier" userId="de6cb9e11468ad32" providerId="LiveId" clId="{08B1F191-BDD3-4D15-9FF0-A4B208AB6D25}" dt="2020-02-10T04:14:17.347" v="2193" actId="1076"/>
+        <pc:chgData name="Jason Wattier" userId="de6cb9e11468ad32" providerId="LiveId" clId="{08B1F191-BDD3-4D15-9FF0-A4B208AB6D25}" dt="2020-02-10T04:45:28.876" v="2243" actId="1035"/>
         <pc:sldMkLst>
           <pc:docMk/>
           <pc:sldMk cId="1897896653" sldId="269"/>
@@ -742,7 +742,7 @@
           </ac:picMkLst>
         </pc:picChg>
         <pc:picChg chg="add mod">
-          <ac:chgData name="Jason Wattier" userId="de6cb9e11468ad32" providerId="LiveId" clId="{08B1F191-BDD3-4D15-9FF0-A4B208AB6D25}" dt="2020-02-10T04:14:17.347" v="2193" actId="1076"/>
+          <ac:chgData name="Jason Wattier" userId="de6cb9e11468ad32" providerId="LiveId" clId="{08B1F191-BDD3-4D15-9FF0-A4B208AB6D25}" dt="2020-02-10T04:45:28.876" v="2243" actId="1035"/>
           <ac:picMkLst>
             <pc:docMk/>
             <pc:sldMk cId="1897896653" sldId="269"/>
@@ -4396,7 +4396,7 @@
         </p:blipFill>
         <p:spPr>
           <a:xfrm>
-            <a:off x="5233133" y="868362"/>
+            <a:off x="5233133" y="782637"/>
             <a:ext cx="4409986" cy="5121275"/>
           </a:xfrm>
           <a:ln>
@@ -5518,13 +5518,13 @@
         <p:spPr/>
         <p:txBody>
           <a:bodyPr>
-            <a:normAutofit/>
+            <a:normAutofit lnSpcReduction="10000"/>
           </a:bodyPr>
           <a:lstStyle/>
           <a:p>
             <a:r>
               <a:rPr lang="en-US" dirty="0"/>
-              <a:t>Combines NTA segmentation with 2010 census data and Pre-K school location as of September 2018.</a:t>
+              <a:t>Utilizes NTA segmentation with 2010 census population data and Pre-K school location as of September 2018.</a:t>
             </a:r>
           </a:p>
           <a:p>

</xml_diff>